<commit_message>
added code in a class battle1vs1() method: manualregime(). added 2 new classes: mantis() & wasp()
</commit_message>
<xml_diff>
--- a/Diagrams/Classes methods and their relations.pptx
+++ b/Diagrams/Classes methods and their relations.pptx
@@ -108,6 +108,11 @@
       </a:defRPr>
     </a:lvl9pPr>
   </p:defaultTextStyle>
+  <p:extLst>
+    <p:ext uri="{EFAFB233-063F-42B5-8137-9DF3F51BA10A}">
+      <p15:sldGuideLst xmlns:p15="http://schemas.microsoft.com/office/powerpoint/2012/main"/>
+    </p:ext>
+  </p:extLst>
 </p:presentation>
 </file>
 
@@ -242,7 +247,7 @@
           <a:p>
             <a:fld id="{E99ADA7B-4000-4674-A318-86D07B79F48F}" type="datetimeFigureOut">
               <a:rPr lang="ru-RU" smtClean="0"/>
-              <a:t>05.11.2021</a:t>
+              <a:t>06.11.2021</a:t>
             </a:fld>
             <a:endParaRPr lang="ru-RU"/>
           </a:p>
@@ -412,7 +417,7 @@
           <a:p>
             <a:fld id="{E99ADA7B-4000-4674-A318-86D07B79F48F}" type="datetimeFigureOut">
               <a:rPr lang="ru-RU" smtClean="0"/>
-              <a:t>05.11.2021</a:t>
+              <a:t>06.11.2021</a:t>
             </a:fld>
             <a:endParaRPr lang="ru-RU"/>
           </a:p>
@@ -592,7 +597,7 @@
           <a:p>
             <a:fld id="{E99ADA7B-4000-4674-A318-86D07B79F48F}" type="datetimeFigureOut">
               <a:rPr lang="ru-RU" smtClean="0"/>
-              <a:t>05.11.2021</a:t>
+              <a:t>06.11.2021</a:t>
             </a:fld>
             <a:endParaRPr lang="ru-RU"/>
           </a:p>
@@ -762,7 +767,7 @@
           <a:p>
             <a:fld id="{E99ADA7B-4000-4674-A318-86D07B79F48F}" type="datetimeFigureOut">
               <a:rPr lang="ru-RU" smtClean="0"/>
-              <a:t>05.11.2021</a:t>
+              <a:t>06.11.2021</a:t>
             </a:fld>
             <a:endParaRPr lang="ru-RU"/>
           </a:p>
@@ -1008,7 +1013,7 @@
           <a:p>
             <a:fld id="{E99ADA7B-4000-4674-A318-86D07B79F48F}" type="datetimeFigureOut">
               <a:rPr lang="ru-RU" smtClean="0"/>
-              <a:t>05.11.2021</a:t>
+              <a:t>06.11.2021</a:t>
             </a:fld>
             <a:endParaRPr lang="ru-RU"/>
           </a:p>
@@ -1240,7 +1245,7 @@
           <a:p>
             <a:fld id="{E99ADA7B-4000-4674-A318-86D07B79F48F}" type="datetimeFigureOut">
               <a:rPr lang="ru-RU" smtClean="0"/>
-              <a:t>05.11.2021</a:t>
+              <a:t>06.11.2021</a:t>
             </a:fld>
             <a:endParaRPr lang="ru-RU"/>
           </a:p>
@@ -1607,7 +1612,7 @@
           <a:p>
             <a:fld id="{E99ADA7B-4000-4674-A318-86D07B79F48F}" type="datetimeFigureOut">
               <a:rPr lang="ru-RU" smtClean="0"/>
-              <a:t>05.11.2021</a:t>
+              <a:t>06.11.2021</a:t>
             </a:fld>
             <a:endParaRPr lang="ru-RU"/>
           </a:p>
@@ -1725,7 +1730,7 @@
           <a:p>
             <a:fld id="{E99ADA7B-4000-4674-A318-86D07B79F48F}" type="datetimeFigureOut">
               <a:rPr lang="ru-RU" smtClean="0"/>
-              <a:t>05.11.2021</a:t>
+              <a:t>06.11.2021</a:t>
             </a:fld>
             <a:endParaRPr lang="ru-RU"/>
           </a:p>
@@ -1820,7 +1825,7 @@
           <a:p>
             <a:fld id="{E99ADA7B-4000-4674-A318-86D07B79F48F}" type="datetimeFigureOut">
               <a:rPr lang="ru-RU" smtClean="0"/>
-              <a:t>05.11.2021</a:t>
+              <a:t>06.11.2021</a:t>
             </a:fld>
             <a:endParaRPr lang="ru-RU"/>
           </a:p>
@@ -2097,7 +2102,7 @@
           <a:p>
             <a:fld id="{E99ADA7B-4000-4674-A318-86D07B79F48F}" type="datetimeFigureOut">
               <a:rPr lang="ru-RU" smtClean="0"/>
-              <a:t>05.11.2021</a:t>
+              <a:t>06.11.2021</a:t>
             </a:fld>
             <a:endParaRPr lang="ru-RU"/>
           </a:p>
@@ -2350,7 +2355,7 @@
           <a:p>
             <a:fld id="{E99ADA7B-4000-4674-A318-86D07B79F48F}" type="datetimeFigureOut">
               <a:rPr lang="ru-RU" smtClean="0"/>
-              <a:t>05.11.2021</a:t>
+              <a:t>06.11.2021</a:t>
             </a:fld>
             <a:endParaRPr lang="ru-RU"/>
           </a:p>
@@ -2563,7 +2568,7 @@
           <a:p>
             <a:fld id="{E99ADA7B-4000-4674-A318-86D07B79F48F}" type="datetimeFigureOut">
               <a:rPr lang="ru-RU" smtClean="0"/>
-              <a:t>05.11.2021</a:t>
+              <a:t>06.11.2021</a:t>
             </a:fld>
             <a:endParaRPr lang="ru-RU"/>
           </a:p>
@@ -3107,11 +3112,7 @@
             <a:pPr lvl="1"/>
             <a:r>
               <a:rPr lang="ru-RU" dirty="0" smtClean="0"/>
-              <a:t>Получить атрибуты </a:t>
-            </a:r>
-            <a:r>
-              <a:rPr lang="ru-RU" dirty="0" smtClean="0"/>
-              <a:t>(начинаются со слова </a:t>
+              <a:t>Получить атрибуты (начинаются со слова </a:t>
             </a:r>
             <a:r>
               <a:rPr lang="en-US" dirty="0"/>
@@ -3345,8 +3346,19 @@
           <a:p>
             <a:r>
               <a:rPr lang="en-US" dirty="0" smtClean="0"/>
-              <a:t>Inferno()</a:t>
-            </a:r>
+              <a:t>Inferno</a:t>
+            </a:r>
+            <a:r>
+              <a:rPr lang="en-US" dirty="0" smtClean="0"/>
+              <a:t>()</a:t>
+            </a:r>
+          </a:p>
+          <a:p>
+            <a:r>
+              <a:rPr lang="en-US" smtClean="0"/>
+              <a:t>Mantis()</a:t>
+            </a:r>
+            <a:endParaRPr lang="en-US" dirty="0" smtClean="0"/>
           </a:p>
           <a:p>
             <a:endParaRPr lang="en-US" dirty="0"/>

</xml_diff>